<commit_message>
added info for readme and presentation
</commit_message>
<xml_diff>
--- a/Bank_App_Presentation_Group_15.pptx
+++ b/Bank_App_Presentation_Group_15.pptx
@@ -64,9 +64,9 @@
         </a:solidFill>
         <a:effectLst/>
         <a:uFillTx/>
-        <a:latin typeface="+mn-lt"/>
-        <a:ea typeface="+mn-ea"/>
-        <a:cs typeface="+mn-cs"/>
+        <a:latin typeface="+mj-lt"/>
+        <a:ea typeface="+mj-ea"/>
+        <a:cs typeface="+mj-cs"/>
         <a:sym typeface="Helvetica Neue"/>
       </a:defRPr>
     </a:lvl1pPr>
@@ -94,9 +94,9 @@
         </a:solidFill>
         <a:effectLst/>
         <a:uFillTx/>
-        <a:latin typeface="+mn-lt"/>
-        <a:ea typeface="+mn-ea"/>
-        <a:cs typeface="+mn-cs"/>
+        <a:latin typeface="+mj-lt"/>
+        <a:ea typeface="+mj-ea"/>
+        <a:cs typeface="+mj-cs"/>
         <a:sym typeface="Helvetica Neue"/>
       </a:defRPr>
     </a:lvl2pPr>
@@ -124,9 +124,9 @@
         </a:solidFill>
         <a:effectLst/>
         <a:uFillTx/>
-        <a:latin typeface="+mn-lt"/>
-        <a:ea typeface="+mn-ea"/>
-        <a:cs typeface="+mn-cs"/>
+        <a:latin typeface="+mj-lt"/>
+        <a:ea typeface="+mj-ea"/>
+        <a:cs typeface="+mj-cs"/>
         <a:sym typeface="Helvetica Neue"/>
       </a:defRPr>
     </a:lvl3pPr>
@@ -154,9 +154,9 @@
         </a:solidFill>
         <a:effectLst/>
         <a:uFillTx/>
-        <a:latin typeface="+mn-lt"/>
-        <a:ea typeface="+mn-ea"/>
-        <a:cs typeface="+mn-cs"/>
+        <a:latin typeface="+mj-lt"/>
+        <a:ea typeface="+mj-ea"/>
+        <a:cs typeface="+mj-cs"/>
         <a:sym typeface="Helvetica Neue"/>
       </a:defRPr>
     </a:lvl4pPr>
@@ -184,9 +184,9 @@
         </a:solidFill>
         <a:effectLst/>
         <a:uFillTx/>
-        <a:latin typeface="+mn-lt"/>
-        <a:ea typeface="+mn-ea"/>
-        <a:cs typeface="+mn-cs"/>
+        <a:latin typeface="+mj-lt"/>
+        <a:ea typeface="+mj-ea"/>
+        <a:cs typeface="+mj-cs"/>
         <a:sym typeface="Helvetica Neue"/>
       </a:defRPr>
     </a:lvl5pPr>
@@ -214,9 +214,9 @@
         </a:solidFill>
         <a:effectLst/>
         <a:uFillTx/>
-        <a:latin typeface="+mn-lt"/>
-        <a:ea typeface="+mn-ea"/>
-        <a:cs typeface="+mn-cs"/>
+        <a:latin typeface="+mj-lt"/>
+        <a:ea typeface="+mj-ea"/>
+        <a:cs typeface="+mj-cs"/>
         <a:sym typeface="Helvetica Neue"/>
       </a:defRPr>
     </a:lvl6pPr>
@@ -244,9 +244,9 @@
         </a:solidFill>
         <a:effectLst/>
         <a:uFillTx/>
-        <a:latin typeface="+mn-lt"/>
-        <a:ea typeface="+mn-ea"/>
-        <a:cs typeface="+mn-cs"/>
+        <a:latin typeface="+mj-lt"/>
+        <a:ea typeface="+mj-ea"/>
+        <a:cs typeface="+mj-cs"/>
         <a:sym typeface="Helvetica Neue"/>
       </a:defRPr>
     </a:lvl7pPr>
@@ -274,9 +274,9 @@
         </a:solidFill>
         <a:effectLst/>
         <a:uFillTx/>
-        <a:latin typeface="+mn-lt"/>
-        <a:ea typeface="+mn-ea"/>
-        <a:cs typeface="+mn-cs"/>
+        <a:latin typeface="+mj-lt"/>
+        <a:ea typeface="+mj-ea"/>
+        <a:cs typeface="+mj-cs"/>
         <a:sym typeface="Helvetica Neue"/>
       </a:defRPr>
     </a:lvl8pPr>
@@ -304,9 +304,9 @@
         </a:solidFill>
         <a:effectLst/>
         <a:uFillTx/>
-        <a:latin typeface="+mn-lt"/>
-        <a:ea typeface="+mn-ea"/>
-        <a:cs typeface="+mn-cs"/>
+        <a:latin typeface="+mj-lt"/>
+        <a:ea typeface="+mj-ea"/>
+        <a:cs typeface="+mj-cs"/>
         <a:sym typeface="Helvetica Neue"/>
       </a:defRPr>
     </a:lvl9pPr>
@@ -394,9 +394,9 @@
         <a:spcPct val="117999"/>
       </a:lnSpc>
       <a:defRPr sz="2200">
-        <a:latin typeface="+mn-lt"/>
-        <a:ea typeface="+mn-ea"/>
-        <a:cs typeface="+mn-cs"/>
+        <a:latin typeface="+mj-lt"/>
+        <a:ea typeface="+mj-ea"/>
+        <a:cs typeface="+mj-cs"/>
         <a:sym typeface="Helvetica Neue"/>
       </a:defRPr>
     </a:lvl1pPr>
@@ -405,9 +405,9 @@
         <a:spcPct val="117999"/>
       </a:lnSpc>
       <a:defRPr sz="2200">
-        <a:latin typeface="+mn-lt"/>
-        <a:ea typeface="+mn-ea"/>
-        <a:cs typeface="+mn-cs"/>
+        <a:latin typeface="+mj-lt"/>
+        <a:ea typeface="+mj-ea"/>
+        <a:cs typeface="+mj-cs"/>
         <a:sym typeface="Helvetica Neue"/>
       </a:defRPr>
     </a:lvl2pPr>
@@ -416,9 +416,9 @@
         <a:spcPct val="117999"/>
       </a:lnSpc>
       <a:defRPr sz="2200">
-        <a:latin typeface="+mn-lt"/>
-        <a:ea typeface="+mn-ea"/>
-        <a:cs typeface="+mn-cs"/>
+        <a:latin typeface="+mj-lt"/>
+        <a:ea typeface="+mj-ea"/>
+        <a:cs typeface="+mj-cs"/>
         <a:sym typeface="Helvetica Neue"/>
       </a:defRPr>
     </a:lvl3pPr>
@@ -427,9 +427,9 @@
         <a:spcPct val="117999"/>
       </a:lnSpc>
       <a:defRPr sz="2200">
-        <a:latin typeface="+mn-lt"/>
-        <a:ea typeface="+mn-ea"/>
-        <a:cs typeface="+mn-cs"/>
+        <a:latin typeface="+mj-lt"/>
+        <a:ea typeface="+mj-ea"/>
+        <a:cs typeface="+mj-cs"/>
         <a:sym typeface="Helvetica Neue"/>
       </a:defRPr>
     </a:lvl4pPr>
@@ -438,9 +438,9 @@
         <a:spcPct val="117999"/>
       </a:lnSpc>
       <a:defRPr sz="2200">
-        <a:latin typeface="+mn-lt"/>
-        <a:ea typeface="+mn-ea"/>
-        <a:cs typeface="+mn-cs"/>
+        <a:latin typeface="+mj-lt"/>
+        <a:ea typeface="+mj-ea"/>
+        <a:cs typeface="+mj-cs"/>
         <a:sym typeface="Helvetica Neue"/>
       </a:defRPr>
     </a:lvl5pPr>
@@ -449,9 +449,9 @@
         <a:spcPct val="117999"/>
       </a:lnSpc>
       <a:defRPr sz="2200">
-        <a:latin typeface="+mn-lt"/>
-        <a:ea typeface="+mn-ea"/>
-        <a:cs typeface="+mn-cs"/>
+        <a:latin typeface="+mj-lt"/>
+        <a:ea typeface="+mj-ea"/>
+        <a:cs typeface="+mj-cs"/>
         <a:sym typeface="Helvetica Neue"/>
       </a:defRPr>
     </a:lvl6pPr>
@@ -460,9 +460,9 @@
         <a:spcPct val="117999"/>
       </a:lnSpc>
       <a:defRPr sz="2200">
-        <a:latin typeface="+mn-lt"/>
-        <a:ea typeface="+mn-ea"/>
-        <a:cs typeface="+mn-cs"/>
+        <a:latin typeface="+mj-lt"/>
+        <a:ea typeface="+mj-ea"/>
+        <a:cs typeface="+mj-cs"/>
         <a:sym typeface="Helvetica Neue"/>
       </a:defRPr>
     </a:lvl7pPr>
@@ -471,9 +471,9 @@
         <a:spcPct val="117999"/>
       </a:lnSpc>
       <a:defRPr sz="2200">
-        <a:latin typeface="+mn-lt"/>
-        <a:ea typeface="+mn-ea"/>
-        <a:cs typeface="+mn-cs"/>
+        <a:latin typeface="+mj-lt"/>
+        <a:ea typeface="+mj-ea"/>
+        <a:cs typeface="+mj-cs"/>
         <a:sym typeface="Helvetica Neue"/>
       </a:defRPr>
     </a:lvl8pPr>
@@ -482,9 +482,9 @@
         <a:spcPct val="117999"/>
       </a:lnSpc>
       <a:defRPr sz="2200">
-        <a:latin typeface="+mn-lt"/>
-        <a:ea typeface="+mn-ea"/>
-        <a:cs typeface="+mn-cs"/>
+        <a:latin typeface="+mj-lt"/>
+        <a:ea typeface="+mj-ea"/>
+        <a:cs typeface="+mj-cs"/>
         <a:sym typeface="Helvetica Neue"/>
       </a:defRPr>
     </a:lvl9pPr>
@@ -520,7 +520,7 @@
         <p:spPr>
           <a:xfrm>
             <a:off x="1201340" y="11859862"/>
-            <a:ext cx="21971004" cy="636980"/>
+            <a:ext cx="21971005" cy="636981"/>
           </a:xfrm>
           <a:prstGeom prst="rect">
             <a:avLst/>
@@ -620,7 +620,7 @@
         <p:spPr>
           <a:xfrm>
             <a:off x="1206496" y="2574991"/>
-            <a:ext cx="21971005" cy="4648202"/>
+            <a:ext cx="21971005" cy="4648203"/>
           </a:xfrm>
           <a:prstGeom prst="rect">
             <a:avLst/>
@@ -652,7 +652,7 @@
         <p:spPr>
           <a:xfrm>
             <a:off x="1201342" y="7223190"/>
-            <a:ext cx="21971002" cy="1905002"/>
+            <a:ext cx="21971002" cy="1905003"/>
           </a:xfrm>
           <a:prstGeom prst="rect">
             <a:avLst/>
@@ -740,7 +740,7 @@
         <p:spPr>
           <a:xfrm>
             <a:off x="1206500" y="1079500"/>
-            <a:ext cx="21971000" cy="1434950"/>
+            <a:ext cx="21971000" cy="1434951"/>
           </a:xfrm>
           <a:prstGeom prst="rect">
             <a:avLst/>
@@ -767,8 +767,8 @@
         </p:nvSpPr>
         <p:spPr>
           <a:xfrm>
-            <a:off x="1206500" y="2372961"/>
-            <a:ext cx="21971000" cy="934781"/>
+            <a:off x="1206500" y="2372960"/>
+            <a:ext cx="21971000" cy="934782"/>
           </a:xfrm>
           <a:prstGeom prst="rect">
             <a:avLst/>
@@ -943,8 +943,8 @@
         </p:nvSpPr>
         <p:spPr>
           <a:xfrm>
-            <a:off x="1206500" y="2372961"/>
-            <a:ext cx="21971000" cy="934781"/>
+            <a:off x="1206500" y="2372960"/>
+            <a:ext cx="21971000" cy="934782"/>
           </a:xfrm>
           <a:prstGeom prst="rect">
             <a:avLst/>
@@ -1308,8 +1308,8 @@
         </p:nvSpPr>
         <p:spPr>
           <a:xfrm>
-            <a:off x="1206500" y="1075926"/>
-            <a:ext cx="21971000" cy="7241586"/>
+            <a:off x="1206500" y="1075925"/>
+            <a:ext cx="21971000" cy="7241587"/>
           </a:xfrm>
           <a:prstGeom prst="rect">
             <a:avLst/>
@@ -1504,8 +1504,8 @@
         </p:nvSpPr>
         <p:spPr>
           <a:xfrm>
-            <a:off x="2430024" y="10675453"/>
-            <a:ext cx="20200054" cy="636980"/>
+            <a:off x="2430023" y="10675453"/>
+            <a:ext cx="20200055" cy="636981"/>
           </a:xfrm>
           <a:prstGeom prst="rect">
             <a:avLst/>
@@ -1605,7 +1605,7 @@
         <p:spPr>
           <a:xfrm>
             <a:off x="1753923" y="4939860"/>
-            <a:ext cx="20876154" cy="3836281"/>
+            <a:ext cx="20876154" cy="3836282"/>
           </a:xfrm>
           <a:prstGeom prst="rect">
             <a:avLst/>
@@ -1614,7 +1614,7 @@
         <p:txBody>
           <a:bodyPr numCol="1" spcCol="38100"/>
           <a:lstStyle>
-            <a:lvl1pPr marL="469900" indent="-300876">
+            <a:lvl1pPr marL="300875" indent="-131851">
               <a:spcBef>
                 <a:spcPts val="0"/>
               </a:spcBef>
@@ -2014,7 +2014,7 @@
         <p:spPr>
           <a:xfrm>
             <a:off x="1207690" y="1106137"/>
-            <a:ext cx="21968621" cy="636980"/>
+            <a:ext cx="21968621" cy="636981"/>
           </a:xfrm>
           <a:prstGeom prst="rect">
             <a:avLst/>
@@ -2114,7 +2114,7 @@
         <p:spPr>
           <a:xfrm>
             <a:off x="1206500" y="11609909"/>
-            <a:ext cx="21971000" cy="1116953"/>
+            <a:ext cx="21971000" cy="1116954"/>
           </a:xfrm>
           <a:prstGeom prst="rect">
             <a:avLst/>
@@ -2444,8 +2444,8 @@
         </p:nvSpPr>
         <p:spPr>
           <a:xfrm>
-            <a:off x="1206500" y="2372961"/>
-            <a:ext cx="21971000" cy="934781"/>
+            <a:off x="1206500" y="2372960"/>
+            <a:ext cx="21971000" cy="934782"/>
           </a:xfrm>
           <a:prstGeom prst="rect">
             <a:avLst/>
@@ -2712,8 +2712,8 @@
         </p:nvSpPr>
         <p:spPr>
           <a:xfrm>
-            <a:off x="1206500" y="2372961"/>
-            <a:ext cx="9779000" cy="934781"/>
+            <a:off x="1206500" y="2372960"/>
+            <a:ext cx="9779000" cy="934782"/>
           </a:xfrm>
           <a:prstGeom prst="rect">
             <a:avLst/>
@@ -2943,8 +2943,8 @@
         </p:nvSpPr>
         <p:spPr>
           <a:xfrm>
-            <a:off x="1206500" y="2372961"/>
-            <a:ext cx="9779000" cy="934781"/>
+            <a:off x="1206500" y="2372960"/>
+            <a:ext cx="9779000" cy="934782"/>
           </a:xfrm>
           <a:prstGeom prst="rect">
             <a:avLst/>
@@ -3147,8 +3147,8 @@
         </p:nvSpPr>
         <p:spPr>
           <a:xfrm>
-            <a:off x="1206500" y="2372961"/>
-            <a:ext cx="9779000" cy="934781"/>
+            <a:off x="1206500" y="2372960"/>
+            <a:ext cx="9779000" cy="934782"/>
           </a:xfrm>
           <a:prstGeom prst="rect">
             <a:avLst/>
@@ -3623,9 +3623,9 @@
             <a:srgbClr val="000000"/>
           </a:solidFill>
           <a:uFillTx/>
-          <a:latin typeface="+mn-lt"/>
-          <a:ea typeface="+mn-ea"/>
-          <a:cs typeface="+mn-cs"/>
+          <a:latin typeface="+mj-lt"/>
+          <a:ea typeface="+mj-ea"/>
+          <a:cs typeface="+mj-cs"/>
           <a:sym typeface="Helvetica Neue"/>
         </a:defRPr>
       </a:lvl1pPr>
@@ -3649,9 +3649,9 @@
             <a:srgbClr val="000000"/>
           </a:solidFill>
           <a:uFillTx/>
-          <a:latin typeface="+mn-lt"/>
-          <a:ea typeface="+mn-ea"/>
-          <a:cs typeface="+mn-cs"/>
+          <a:latin typeface="+mj-lt"/>
+          <a:ea typeface="+mj-ea"/>
+          <a:cs typeface="+mj-cs"/>
           <a:sym typeface="Helvetica Neue"/>
         </a:defRPr>
       </a:lvl2pPr>
@@ -3675,9 +3675,9 @@
             <a:srgbClr val="000000"/>
           </a:solidFill>
           <a:uFillTx/>
-          <a:latin typeface="+mn-lt"/>
-          <a:ea typeface="+mn-ea"/>
-          <a:cs typeface="+mn-cs"/>
+          <a:latin typeface="+mj-lt"/>
+          <a:ea typeface="+mj-ea"/>
+          <a:cs typeface="+mj-cs"/>
           <a:sym typeface="Helvetica Neue"/>
         </a:defRPr>
       </a:lvl3pPr>
@@ -3701,9 +3701,9 @@
             <a:srgbClr val="000000"/>
           </a:solidFill>
           <a:uFillTx/>
-          <a:latin typeface="+mn-lt"/>
-          <a:ea typeface="+mn-ea"/>
-          <a:cs typeface="+mn-cs"/>
+          <a:latin typeface="+mj-lt"/>
+          <a:ea typeface="+mj-ea"/>
+          <a:cs typeface="+mj-cs"/>
           <a:sym typeface="Helvetica Neue"/>
         </a:defRPr>
       </a:lvl4pPr>
@@ -3727,9 +3727,9 @@
             <a:srgbClr val="000000"/>
           </a:solidFill>
           <a:uFillTx/>
-          <a:latin typeface="+mn-lt"/>
-          <a:ea typeface="+mn-ea"/>
-          <a:cs typeface="+mn-cs"/>
+          <a:latin typeface="+mj-lt"/>
+          <a:ea typeface="+mj-ea"/>
+          <a:cs typeface="+mj-cs"/>
           <a:sym typeface="Helvetica Neue"/>
         </a:defRPr>
       </a:lvl5pPr>
@@ -3753,9 +3753,9 @@
             <a:srgbClr val="000000"/>
           </a:solidFill>
           <a:uFillTx/>
-          <a:latin typeface="+mn-lt"/>
-          <a:ea typeface="+mn-ea"/>
-          <a:cs typeface="+mn-cs"/>
+          <a:latin typeface="+mj-lt"/>
+          <a:ea typeface="+mj-ea"/>
+          <a:cs typeface="+mj-cs"/>
           <a:sym typeface="Helvetica Neue"/>
         </a:defRPr>
       </a:lvl6pPr>
@@ -3779,9 +3779,9 @@
             <a:srgbClr val="000000"/>
           </a:solidFill>
           <a:uFillTx/>
-          <a:latin typeface="+mn-lt"/>
-          <a:ea typeface="+mn-ea"/>
-          <a:cs typeface="+mn-cs"/>
+          <a:latin typeface="+mj-lt"/>
+          <a:ea typeface="+mj-ea"/>
+          <a:cs typeface="+mj-cs"/>
           <a:sym typeface="Helvetica Neue"/>
         </a:defRPr>
       </a:lvl7pPr>
@@ -3805,9 +3805,9 @@
             <a:srgbClr val="000000"/>
           </a:solidFill>
           <a:uFillTx/>
-          <a:latin typeface="+mn-lt"/>
-          <a:ea typeface="+mn-ea"/>
-          <a:cs typeface="+mn-cs"/>
+          <a:latin typeface="+mj-lt"/>
+          <a:ea typeface="+mj-ea"/>
+          <a:cs typeface="+mj-cs"/>
           <a:sym typeface="Helvetica Neue"/>
         </a:defRPr>
       </a:lvl8pPr>
@@ -3831,9 +3831,9 @@
             <a:srgbClr val="000000"/>
           </a:solidFill>
           <a:uFillTx/>
-          <a:latin typeface="+mn-lt"/>
-          <a:ea typeface="+mn-ea"/>
-          <a:cs typeface="+mn-cs"/>
+          <a:latin typeface="+mj-lt"/>
+          <a:ea typeface="+mj-ea"/>
+          <a:cs typeface="+mj-cs"/>
           <a:sym typeface="Helvetica Neue"/>
         </a:defRPr>
       </a:lvl9pPr>
@@ -3859,9 +3859,9 @@
             <a:srgbClr val="000000"/>
           </a:solidFill>
           <a:uFillTx/>
-          <a:latin typeface="+mn-lt"/>
-          <a:ea typeface="+mn-ea"/>
-          <a:cs typeface="+mn-cs"/>
+          <a:latin typeface="+mj-lt"/>
+          <a:ea typeface="+mj-ea"/>
+          <a:cs typeface="+mj-cs"/>
           <a:sym typeface="Helvetica Neue"/>
         </a:defRPr>
       </a:lvl1pPr>
@@ -3885,9 +3885,9 @@
             <a:srgbClr val="000000"/>
           </a:solidFill>
           <a:uFillTx/>
-          <a:latin typeface="+mn-lt"/>
-          <a:ea typeface="+mn-ea"/>
-          <a:cs typeface="+mn-cs"/>
+          <a:latin typeface="+mj-lt"/>
+          <a:ea typeface="+mj-ea"/>
+          <a:cs typeface="+mj-cs"/>
           <a:sym typeface="Helvetica Neue"/>
         </a:defRPr>
       </a:lvl2pPr>
@@ -3911,9 +3911,9 @@
             <a:srgbClr val="000000"/>
           </a:solidFill>
           <a:uFillTx/>
-          <a:latin typeface="+mn-lt"/>
-          <a:ea typeface="+mn-ea"/>
-          <a:cs typeface="+mn-cs"/>
+          <a:latin typeface="+mj-lt"/>
+          <a:ea typeface="+mj-ea"/>
+          <a:cs typeface="+mj-cs"/>
           <a:sym typeface="Helvetica Neue"/>
         </a:defRPr>
       </a:lvl3pPr>
@@ -3937,9 +3937,9 @@
             <a:srgbClr val="000000"/>
           </a:solidFill>
           <a:uFillTx/>
-          <a:latin typeface="+mn-lt"/>
-          <a:ea typeface="+mn-ea"/>
-          <a:cs typeface="+mn-cs"/>
+          <a:latin typeface="+mj-lt"/>
+          <a:ea typeface="+mj-ea"/>
+          <a:cs typeface="+mj-cs"/>
           <a:sym typeface="Helvetica Neue"/>
         </a:defRPr>
       </a:lvl4pPr>
@@ -3963,9 +3963,9 @@
             <a:srgbClr val="000000"/>
           </a:solidFill>
           <a:uFillTx/>
-          <a:latin typeface="+mn-lt"/>
-          <a:ea typeface="+mn-ea"/>
-          <a:cs typeface="+mn-cs"/>
+          <a:latin typeface="+mj-lt"/>
+          <a:ea typeface="+mj-ea"/>
+          <a:cs typeface="+mj-cs"/>
           <a:sym typeface="Helvetica Neue"/>
         </a:defRPr>
       </a:lvl5pPr>
@@ -3989,9 +3989,9 @@
             <a:srgbClr val="000000"/>
           </a:solidFill>
           <a:uFillTx/>
-          <a:latin typeface="+mn-lt"/>
-          <a:ea typeface="+mn-ea"/>
-          <a:cs typeface="+mn-cs"/>
+          <a:latin typeface="+mj-lt"/>
+          <a:ea typeface="+mj-ea"/>
+          <a:cs typeface="+mj-cs"/>
           <a:sym typeface="Helvetica Neue"/>
         </a:defRPr>
       </a:lvl6pPr>
@@ -4015,9 +4015,9 @@
             <a:srgbClr val="000000"/>
           </a:solidFill>
           <a:uFillTx/>
-          <a:latin typeface="+mn-lt"/>
-          <a:ea typeface="+mn-ea"/>
-          <a:cs typeface="+mn-cs"/>
+          <a:latin typeface="+mj-lt"/>
+          <a:ea typeface="+mj-ea"/>
+          <a:cs typeface="+mj-cs"/>
           <a:sym typeface="Helvetica Neue"/>
         </a:defRPr>
       </a:lvl7pPr>
@@ -4041,9 +4041,9 @@
             <a:srgbClr val="000000"/>
           </a:solidFill>
           <a:uFillTx/>
-          <a:latin typeface="+mn-lt"/>
-          <a:ea typeface="+mn-ea"/>
-          <a:cs typeface="+mn-cs"/>
+          <a:latin typeface="+mj-lt"/>
+          <a:ea typeface="+mj-ea"/>
+          <a:cs typeface="+mj-cs"/>
           <a:sym typeface="Helvetica Neue"/>
         </a:defRPr>
       </a:lvl8pPr>
@@ -4067,9 +4067,9 @@
             <a:srgbClr val="000000"/>
           </a:solidFill>
           <a:uFillTx/>
-          <a:latin typeface="+mn-lt"/>
-          <a:ea typeface="+mn-ea"/>
-          <a:cs typeface="+mn-cs"/>
+          <a:latin typeface="+mj-lt"/>
+          <a:ea typeface="+mj-ea"/>
+          <a:cs typeface="+mj-cs"/>
           <a:sym typeface="Helvetica Neue"/>
         </a:defRPr>
       </a:lvl9pPr>
@@ -4353,7 +4353,7 @@
         <p:spPr>
           <a:xfrm>
             <a:off x="1201341" y="11859862"/>
-            <a:ext cx="21971002" cy="636980"/>
+            <a:ext cx="21971002" cy="636981"/>
           </a:xfrm>
           <a:prstGeom prst="rect">
             <a:avLst/>
@@ -4388,8 +4388,8 @@
         </p:nvSpPr>
         <p:spPr>
           <a:xfrm>
-            <a:off x="1206495" y="2574991"/>
-            <a:ext cx="21971006" cy="4648202"/>
+            <a:off x="1206494" y="2574991"/>
+            <a:ext cx="21971008" cy="4648203"/>
           </a:xfrm>
           <a:prstGeom prst="rect">
             <a:avLst/>
@@ -4399,7 +4399,7 @@
           <a:bodyPr/>
           <a:lstStyle>
             <a:lvl1pPr algn="ctr">
-              <a:defRPr spc="-144" sz="7200">
+              <a:defRPr spc="-200" sz="7200">
                 <a:solidFill>
                   <a:srgbClr val="0B1F3A"/>
                 </a:solidFill>
@@ -4422,8 +4422,8 @@
         </p:nvSpPr>
         <p:spPr>
           <a:xfrm>
-            <a:off x="1206499" y="12577989"/>
-            <a:ext cx="21971002" cy="636980"/>
+            <a:off x="1206499" y="12577988"/>
+            <a:ext cx="21971002" cy="636981"/>
           </a:xfrm>
           <a:prstGeom prst="rect">
             <a:avLst/>
@@ -4586,7 +4586,6 @@
             <a:r>
               <a:t>Näyttää, että Windowsille meillä on Inno Setup -asennusohjelma, kuvakkeet kaikkialla ja oma poisto-ohjelma</a:t>
             </a:r>
-            <a:endParaRPr b="0"/>
           </a:p>
           <a:p>
             <a:pPr marL="240631" indent="-240631" defTabSz="457200">
@@ -4610,7 +4609,6 @@
             <a:r>
               <a:t>Näyttää, että Macille meillä on asennusohjelma ja kuvakkeet</a:t>
             </a:r>
-            <a:endParaRPr b="0"/>
           </a:p>
           <a:p>
             <a:pPr marL="240631" indent="-240631" defTabSz="457200">
@@ -4634,7 +4632,6 @@
             <a:r>
               <a:t>Meillä on GitHub Actions: build &amp; release sekä kuvaukset etusivulla</a:t>
             </a:r>
-            <a:endParaRPr b="0"/>
           </a:p>
           <a:p>
             <a:pPr marL="240631" indent="-240631" defTabSz="457200">
@@ -4658,7 +4655,6 @@
             <a:r>
               <a:t>Meillä on kaksi tietokantaa: MySQL ja MariaDB</a:t>
             </a:r>
-            <a:endParaRPr b="0"/>
           </a:p>
           <a:p>
             <a:pPr marL="240631" indent="-240631" defTabSz="457200">
@@ -4682,7 +4678,6 @@
             <a:r>
               <a:t>Meillä on skenaariot kaikille mahdollisille asiakastyypeille</a:t>
             </a:r>
-            <a:endParaRPr b="0"/>
           </a:p>
           <a:p>
             <a:pPr marL="240631" indent="-240631" defTabSz="457200">
@@ -4706,7 +4701,6 @@
             <a:r>
               <a:t>Meillä on tuki kaksoiskorteille</a:t>
             </a:r>
-            <a:endParaRPr b="0"/>
           </a:p>
           <a:p>
             <a:pPr marL="240631" indent="-240631" defTabSz="457200">
@@ -4730,7 +4724,6 @@
             <a:r>
               <a:t>Meillä on talletustoiminto (deposit)</a:t>
             </a:r>
-            <a:endParaRPr b="0"/>
           </a:p>
           <a:p>
             <a:pPr marL="240631" indent="-240631" defTabSz="457200">
@@ -4752,9 +4745,8 @@
               </a:defRPr>
             </a:pPr>
             <a:r>
-              <a:t>Meillä on digitaalinen kuitti</a:t>
-            </a:r>
-            <a:endParaRPr b="0"/>
+              <a:t>Meillä on digitaalinen kuitti, miten se on toteutettu</a:t>
+            </a:r>
           </a:p>
           <a:p>
             <a:pPr marL="240631" indent="-240631" defTabSz="457200">
@@ -4778,7 +4770,6 @@
             <a:r>
               <a:t>Meillä on valuuttatuki</a:t>
             </a:r>
-            <a:endParaRPr b="0"/>
           </a:p>
           <a:p>
             <a:pPr marL="240631" indent="-240631" defTabSz="457200">
@@ -4802,7 +4793,6 @@
             <a:r>
               <a:t>Näyttää, miltä kaikki näyttää Windowsissa (lyhyt video/esittely)</a:t>
             </a:r>
-            <a:endParaRPr b="0"/>
           </a:p>
           <a:p>
             <a:pPr marL="240631" indent="-240631" defTabSz="457200">
@@ -4825,6 +4815,29 @@
             </a:pPr>
             <a:r>
               <a:t>Näyttää, miltä kaikki näyttää MacBookilla (lyhyt video/esittely)</a:t>
+            </a:r>
+          </a:p>
+          <a:p>
+            <a:pPr marL="240631" indent="-240631" defTabSz="457200">
+              <a:lnSpc>
+                <a:spcPct val="100000"/>
+              </a:lnSpc>
+              <a:spcBef>
+                <a:spcPts val="0"/>
+              </a:spcBef>
+              <a:buSzPct val="100000"/>
+              <a:tabLst>
+                <a:tab pos="139700" algn="l"/>
+                <a:tab pos="457200" algn="l"/>
+              </a:tabLst>
+              <a:defRPr b="1" sz="2400">
+                <a:solidFill>
+                  <a:srgbClr val="0D0D0D"/>
+                </a:solidFill>
+              </a:defRPr>
+            </a:pPr>
+            <a:r>
+              <a:t>Käytettiin menetelmä, jossa ei tule ikkunan päälle muita ikkunoita, joten se vastaa oikeasti ATM ulkonäköä</a:t>
             </a:r>
           </a:p>
         </p:txBody>
@@ -4881,14 +4894,14 @@
     </a:clrScheme>
     <a:fontScheme name="21_BasicWhite">
       <a:majorFont>
+        <a:latin typeface="Helvetica Neue"/>
+        <a:ea typeface="Helvetica Neue"/>
+        <a:cs typeface="Helvetica Neue"/>
+      </a:majorFont>
+      <a:minorFont>
         <a:latin typeface="Helvetica"/>
         <a:ea typeface="Helvetica"/>
         <a:cs typeface="Helvetica"/>
-      </a:majorFont>
-      <a:minorFont>
-        <a:latin typeface="Helvetica Neue"/>
-        <a:ea typeface="Helvetica Neue"/>
-        <a:cs typeface="Helvetica Neue"/>
       </a:minorFont>
     </a:fontScheme>
     <a:fmtScheme name="21_BasicWhite">
@@ -5069,9 +5082,9 @@
             </a:solidFill>
             <a:effectLst/>
             <a:uFillTx/>
-            <a:latin typeface="+mn-lt"/>
-            <a:ea typeface="+mn-ea"/>
-            <a:cs typeface="+mn-cs"/>
+            <a:latin typeface="+mj-lt"/>
+            <a:ea typeface="+mj-ea"/>
+            <a:cs typeface="+mj-cs"/>
             <a:sym typeface="Helvetica Neue"/>
           </a:defRPr>
         </a:defPPr>
@@ -5640,9 +5653,9 @@
             </a:solidFill>
             <a:effectLst/>
             <a:uFillTx/>
-            <a:latin typeface="+mn-lt"/>
-            <a:ea typeface="+mn-ea"/>
-            <a:cs typeface="+mn-cs"/>
+            <a:latin typeface="+mj-lt"/>
+            <a:ea typeface="+mj-ea"/>
+            <a:cs typeface="+mj-cs"/>
             <a:sym typeface="Helvetica Neue"/>
           </a:defRPr>
         </a:defPPr>
@@ -5935,14 +5948,14 @@
     </a:clrScheme>
     <a:fontScheme name="21_BasicWhite">
       <a:majorFont>
+        <a:latin typeface="Helvetica Neue"/>
+        <a:ea typeface="Helvetica Neue"/>
+        <a:cs typeface="Helvetica Neue"/>
+      </a:majorFont>
+      <a:minorFont>
         <a:latin typeface="Helvetica"/>
         <a:ea typeface="Helvetica"/>
         <a:cs typeface="Helvetica"/>
-      </a:majorFont>
-      <a:minorFont>
-        <a:latin typeface="Helvetica Neue"/>
-        <a:ea typeface="Helvetica Neue"/>
-        <a:cs typeface="Helvetica Neue"/>
       </a:minorFont>
     </a:fontScheme>
     <a:fmtScheme name="21_BasicWhite">
@@ -6123,9 +6136,9 @@
             </a:solidFill>
             <a:effectLst/>
             <a:uFillTx/>
-            <a:latin typeface="+mn-lt"/>
-            <a:ea typeface="+mn-ea"/>
-            <a:cs typeface="+mn-cs"/>
+            <a:latin typeface="+mj-lt"/>
+            <a:ea typeface="+mj-ea"/>
+            <a:cs typeface="+mj-cs"/>
             <a:sym typeface="Helvetica Neue"/>
           </a:defRPr>
         </a:defPPr>
@@ -6694,9 +6707,9 @@
             </a:solidFill>
             <a:effectLst/>
             <a:uFillTx/>
-            <a:latin typeface="+mn-lt"/>
-            <a:ea typeface="+mn-ea"/>
-            <a:cs typeface="+mn-cs"/>
+            <a:latin typeface="+mj-lt"/>
+            <a:ea typeface="+mj-ea"/>
+            <a:cs typeface="+mj-cs"/>
             <a:sym typeface="Helvetica Neue"/>
           </a:defRPr>
         </a:defPPr>

</xml_diff>